<commit_message>
specified tasks and updated
</commit_message>
<xml_diff>
--- a/session11/PsychoPy_session2.pptx
+++ b/session11/PsychoPy_session2.pptx
@@ -10,8 +10,7 @@
     <p:sldId id="261" r:id="rId4"/>
     <p:sldId id="259" r:id="rId5"/>
     <p:sldId id="262" r:id="rId6"/>
-    <p:sldId id="260" r:id="rId7"/>
-    <p:sldId id="257" r:id="rId8"/>
+    <p:sldId id="257" r:id="rId7"/>
   </p:sldIdLst>
   <p:sldSz cx="12192000" cy="6858000"/>
   <p:notesSz cx="6858000" cy="9144000"/>
@@ -267,7 +266,7 @@
           <a:p>
             <a:fld id="{B4F1A0AE-A6F4-8D4C-A768-EB9C2A4BFD9B}" type="datetimeFigureOut">
               <a:rPr lang="en-GB" smtClean="0"/>
-              <a:t>16/01/2020</a:t>
+              <a:t>13/02/2020</a:t>
             </a:fld>
             <a:endParaRPr lang="en-GB"/>
           </a:p>
@@ -442,7 +441,7 @@
           <a:p>
             <a:fld id="{B4F1A0AE-A6F4-8D4C-A768-EB9C2A4BFD9B}" type="datetimeFigureOut">
               <a:rPr lang="en-GB" smtClean="0"/>
-              <a:t>16/01/2020</a:t>
+              <a:t>13/02/2020</a:t>
             </a:fld>
             <a:endParaRPr lang="en-GB"/>
           </a:p>
@@ -627,7 +626,7 @@
           <a:p>
             <a:fld id="{B4F1A0AE-A6F4-8D4C-A768-EB9C2A4BFD9B}" type="datetimeFigureOut">
               <a:rPr lang="en-GB" smtClean="0"/>
-              <a:t>16/01/2020</a:t>
+              <a:t>13/02/2020</a:t>
             </a:fld>
             <a:endParaRPr lang="en-GB"/>
           </a:p>
@@ -802,7 +801,7 @@
           <a:p>
             <a:fld id="{B4F1A0AE-A6F4-8D4C-A768-EB9C2A4BFD9B}" type="datetimeFigureOut">
               <a:rPr lang="en-GB" smtClean="0"/>
-              <a:t>16/01/2020</a:t>
+              <a:t>13/02/2020</a:t>
             </a:fld>
             <a:endParaRPr lang="en-GB"/>
           </a:p>
@@ -1082,7 +1081,7 @@
           <a:p>
             <a:fld id="{B4F1A0AE-A6F4-8D4C-A768-EB9C2A4BFD9B}" type="datetimeFigureOut">
               <a:rPr lang="en-GB" smtClean="0"/>
-              <a:t>16/01/2020</a:t>
+              <a:t>13/02/2020</a:t>
             </a:fld>
             <a:endParaRPr lang="en-GB"/>
           </a:p>
@@ -1300,7 +1299,7 @@
           <a:p>
             <a:fld id="{B4F1A0AE-A6F4-8D4C-A768-EB9C2A4BFD9B}" type="datetimeFigureOut">
               <a:rPr lang="en-GB" smtClean="0"/>
-              <a:t>16/01/2020</a:t>
+              <a:t>13/02/2020</a:t>
             </a:fld>
             <a:endParaRPr lang="en-GB"/>
           </a:p>
@@ -1673,7 +1672,7 @@
           <a:p>
             <a:fld id="{B4F1A0AE-A6F4-8D4C-A768-EB9C2A4BFD9B}" type="datetimeFigureOut">
               <a:rPr lang="en-GB" smtClean="0"/>
-              <a:t>16/01/2020</a:t>
+              <a:t>13/02/2020</a:t>
             </a:fld>
             <a:endParaRPr lang="en-GB"/>
           </a:p>
@@ -1815,7 +1814,7 @@
           <a:p>
             <a:fld id="{B4F1A0AE-A6F4-8D4C-A768-EB9C2A4BFD9B}" type="datetimeFigureOut">
               <a:rPr lang="en-GB" smtClean="0"/>
-              <a:t>16/01/2020</a:t>
+              <a:t>13/02/2020</a:t>
             </a:fld>
             <a:endParaRPr lang="en-GB"/>
           </a:p>
@@ -1928,7 +1927,7 @@
           <a:p>
             <a:fld id="{B4F1A0AE-A6F4-8D4C-A768-EB9C2A4BFD9B}" type="datetimeFigureOut">
               <a:rPr lang="en-GB" smtClean="0"/>
-              <a:t>16/01/2020</a:t>
+              <a:t>13/02/2020</a:t>
             </a:fld>
             <a:endParaRPr lang="en-GB"/>
           </a:p>
@@ -2220,7 +2219,7 @@
           <a:p>
             <a:fld id="{B4F1A0AE-A6F4-8D4C-A768-EB9C2A4BFD9B}" type="datetimeFigureOut">
               <a:rPr lang="en-GB" smtClean="0"/>
-              <a:t>16/01/2020</a:t>
+              <a:t>13/02/2020</a:t>
             </a:fld>
             <a:endParaRPr lang="en-GB"/>
           </a:p>
@@ -2513,7 +2512,7 @@
           <a:p>
             <a:fld id="{B4F1A0AE-A6F4-8D4C-A768-EB9C2A4BFD9B}" type="datetimeFigureOut">
               <a:rPr lang="en-GB" smtClean="0"/>
-              <a:t>16/01/2020</a:t>
+              <a:t>13/02/2020</a:t>
             </a:fld>
             <a:endParaRPr lang="en-GB"/>
           </a:p>
@@ -2731,7 +2730,7 @@
           <a:p>
             <a:fld id="{B4F1A0AE-A6F4-8D4C-A768-EB9C2A4BFD9B}" type="datetimeFigureOut">
               <a:rPr lang="en-GB" smtClean="0"/>
-              <a:t>16/01/2020</a:t>
+              <a:t>13/02/2020</a:t>
             </a:fld>
             <a:endParaRPr lang="en-GB"/>
           </a:p>
@@ -3453,7 +3452,7 @@
         <p:spPr>
           <a:xfrm>
             <a:off x="4180114" y="5152311"/>
-            <a:ext cx="3893823" cy="369332"/>
+            <a:ext cx="7472238" cy="646331"/>
           </a:xfrm>
           <a:prstGeom prst="rect">
             <a:avLst/>
@@ -3472,7 +3471,17 @@
                   <a:schemeClr val="bg1"/>
                 </a:solidFill>
               </a:rPr>
-              <a:t>Task 1: try to rebuild this dialogue box!</a:t>
+              <a:t>Task 1: Try to rebuild this dialogue box! Add it to the experiment script from </a:t>
+            </a:r>
+          </a:p>
+          <a:p>
+            <a:r>
+              <a:rPr lang="en-GB" b="1" dirty="0">
+                <a:solidFill>
+                  <a:schemeClr val="bg1"/>
+                </a:solidFill>
+              </a:rPr>
+              <a:t>             last session.</a:t>
             </a:r>
           </a:p>
         </p:txBody>
@@ -3491,7 +3500,7 @@
         </p:nvSpPr>
         <p:spPr>
           <a:xfrm>
-            <a:off x="4180114" y="5521643"/>
+            <a:off x="4180114" y="5779226"/>
             <a:ext cx="5963043" cy="646331"/>
           </a:xfrm>
           <a:prstGeom prst="rect">
@@ -3955,7 +3964,7 @@
                 <a:ea typeface="Apple Color Emoji" pitchFamily="2" charset="0"/>
                 <a:cs typeface="Euphemia UCAS" panose="020B0503040102020104" pitchFamily="34" charset="-79"/>
               </a:rPr>
-              <a:t>.dictionary --&gt; returns the filled-in dictionary</a:t>
+              <a:t>.dictionary --&gt; contains the filled-in dictionary</a:t>
             </a:r>
           </a:p>
           <a:p>
@@ -4891,7 +4900,7 @@
                   <a:schemeClr val="bg1"/>
                 </a:solidFill>
               </a:rPr>
-              <a:t>We can simply use python’s built-in ability to write data to a file. That is, the way of logging data shown on this slide is not at all specific to </a:t>
+              <a:t>We can simply use python’s built-in commands to write data to a file. That is, the way of logging data shown on this slide is not at all specific to </a:t>
             </a:r>
             <a:r>
               <a:rPr lang="en-GB" dirty="0" err="1">
@@ -4973,7 +4982,23 @@
                   <a:schemeClr val="bg1"/>
                 </a:solidFill>
               </a:rPr>
-              <a:t>Create a logfile to store all info like RTs and key presses.</a:t>
+              <a:t>Create a logfile to store all </a:t>
+            </a:r>
+            <a:r>
+              <a:rPr lang="en-GB" dirty="0" err="1">
+                <a:solidFill>
+                  <a:schemeClr val="bg1"/>
+                </a:solidFill>
+              </a:rPr>
+              <a:t>infos</a:t>
+            </a:r>
+            <a:r>
+              <a:rPr lang="en-GB" dirty="0">
+                <a:solidFill>
+                  <a:schemeClr val="bg1"/>
+                </a:solidFill>
+              </a:rPr>
+              <a:t> like RTs and key presses.</a:t>
             </a:r>
             <a:endParaRPr lang="en-GB" u="sng" dirty="0">
               <a:solidFill>
@@ -5779,1019 +5804,6 @@
             <p:ph type="title"/>
           </p:nvPr>
         </p:nvSpPr>
-        <p:spPr>
-          <a:xfrm>
-            <a:off x="838200" y="-32910"/>
-            <a:ext cx="10515600" cy="1325563"/>
-          </a:xfrm>
-        </p:spPr>
-        <p:txBody>
-          <a:bodyPr/>
-          <a:lstStyle/>
-          <a:p>
-            <a:r>
-              <a:rPr lang="en-GB" b="1" dirty="0">
-                <a:solidFill>
-                  <a:schemeClr val="accent4">
-                    <a:lumMod val="60000"/>
-                    <a:lumOff val="40000"/>
-                  </a:schemeClr>
-                </a:solidFill>
-                <a:latin typeface="Euphemia UCAS" panose="020B0503040102020104" pitchFamily="34" charset="-79"/>
-                <a:cs typeface="Euphemia UCAS" panose="020B0503040102020104" pitchFamily="34" charset="-79"/>
-              </a:rPr>
-              <a:t>Randomizing trials/conditions…</a:t>
-            </a:r>
-          </a:p>
-        </p:txBody>
-      </p:sp>
-      <p:sp>
-        <p:nvSpPr>
-          <p:cNvPr id="4" name="Rechteck 3">
-            <a:extLst>
-              <a:ext uri="{FF2B5EF4-FFF2-40B4-BE49-F238E27FC236}">
-                <a16:creationId xmlns:a16="http://schemas.microsoft.com/office/drawing/2014/main" id="{93799ADC-F207-B04D-AAE5-A5E47C6FC9B7}"/>
-              </a:ext>
-            </a:extLst>
-          </p:cNvPr>
-          <p:cNvSpPr/>
-          <p:nvPr/>
-        </p:nvSpPr>
-        <p:spPr>
-          <a:xfrm>
-            <a:off x="528533" y="1039691"/>
-            <a:ext cx="4569824" cy="3709642"/>
-          </a:xfrm>
-          <a:prstGeom prst="rect">
-            <a:avLst/>
-          </a:prstGeom>
-          <a:noFill/>
-          <a:ln w="38100">
-            <a:noFill/>
-          </a:ln>
-        </p:spPr>
-        <p:style>
-          <a:lnRef idx="2">
-            <a:schemeClr val="accent1">
-              <a:shade val="50000"/>
-            </a:schemeClr>
-          </a:lnRef>
-          <a:fillRef idx="1">
-            <a:schemeClr val="accent1"/>
-          </a:fillRef>
-          <a:effectRef idx="0">
-            <a:schemeClr val="accent1"/>
-          </a:effectRef>
-          <a:fontRef idx="minor">
-            <a:schemeClr val="lt1"/>
-          </a:fontRef>
-        </p:style>
-        <p:txBody>
-          <a:bodyPr rtlCol="0" anchor="t"/>
-          <a:lstStyle/>
-          <a:p>
-            <a:r>
-              <a:rPr lang="en-GB" dirty="0">
-                <a:solidFill>
-                  <a:schemeClr val="bg1"/>
-                </a:solidFill>
-              </a:rPr>
-              <a:t>Often we are interested in randomizing the order of our trials or in assigning subjects to a condition in a randomized fashion.</a:t>
-            </a:r>
-          </a:p>
-          <a:p>
-            <a:endParaRPr lang="en-GB" dirty="0">
-              <a:solidFill>
-                <a:schemeClr val="bg1"/>
-              </a:solidFill>
-            </a:endParaRPr>
-          </a:p>
-        </p:txBody>
-      </p:sp>
-      <p:sp>
-        <p:nvSpPr>
-          <p:cNvPr id="7" name="Textfeld 6">
-            <a:extLst>
-              <a:ext uri="{FF2B5EF4-FFF2-40B4-BE49-F238E27FC236}">
-                <a16:creationId xmlns:a16="http://schemas.microsoft.com/office/drawing/2014/main" id="{84E24F93-189B-8D4A-82B8-9CB58878765D}"/>
-              </a:ext>
-            </a:extLst>
-          </p:cNvPr>
-          <p:cNvSpPr txBox="1"/>
-          <p:nvPr/>
-        </p:nvSpPr>
-        <p:spPr>
-          <a:xfrm>
-            <a:off x="5239914" y="1076868"/>
-            <a:ext cx="6423553" cy="646331"/>
-          </a:xfrm>
-          <a:prstGeom prst="rect">
-            <a:avLst/>
-          </a:prstGeom>
-          <a:solidFill>
-            <a:schemeClr val="accent4">
-              <a:lumMod val="60000"/>
-              <a:lumOff val="40000"/>
-            </a:schemeClr>
-          </a:solidFill>
-          <a:ln w="38100">
-            <a:solidFill>
-              <a:schemeClr val="bg1"/>
-            </a:solidFill>
-          </a:ln>
-        </p:spPr>
-        <p:txBody>
-          <a:bodyPr wrap="none" rtlCol="0">
-            <a:spAutoFit/>
-          </a:bodyPr>
-          <a:lstStyle/>
-          <a:p>
-            <a:r>
-              <a:rPr lang="en-GB" sz="2000" dirty="0" err="1">
-                <a:latin typeface="Euphemia UCAS" panose="020B0503040102020104" pitchFamily="34" charset="-79"/>
-                <a:ea typeface="Apple Color Emoji" pitchFamily="2" charset="0"/>
-                <a:cs typeface="Euphemia UCAS" panose="020B0503040102020104" pitchFamily="34" charset="-79"/>
-              </a:rPr>
-              <a:t>random.</a:t>
-            </a:r>
-            <a:r>
-              <a:rPr lang="en-GB" sz="2000" b="1" dirty="0" err="1">
-                <a:latin typeface="Euphemia UCAS" panose="020B0503040102020104" pitchFamily="34" charset="-79"/>
-                <a:ea typeface="Apple Color Emoji" pitchFamily="2" charset="0"/>
-                <a:cs typeface="Euphemia UCAS" panose="020B0503040102020104" pitchFamily="34" charset="-79"/>
-              </a:rPr>
-              <a:t>shuffle</a:t>
-            </a:r>
-            <a:r>
-              <a:rPr lang="en-GB" sz="2000" b="1" dirty="0">
-                <a:latin typeface="Euphemia UCAS" panose="020B0503040102020104" pitchFamily="34" charset="-79"/>
-                <a:ea typeface="Apple Color Emoji" pitchFamily="2" charset="0"/>
-                <a:cs typeface="Euphemia UCAS" panose="020B0503040102020104" pitchFamily="34" charset="-79"/>
-              </a:rPr>
-              <a:t>(</a:t>
-            </a:r>
-            <a:r>
-              <a:rPr lang="en-GB" sz="1400" dirty="0" err="1">
-                <a:latin typeface="Euphemia UCAS" panose="020B0503040102020104" pitchFamily="34" charset="-79"/>
-                <a:ea typeface="Apple Color Emoji" pitchFamily="2" charset="0"/>
-                <a:cs typeface="Euphemia UCAS" panose="020B0503040102020104" pitchFamily="34" charset="-79"/>
-              </a:rPr>
-              <a:t>some_list</a:t>
-            </a:r>
-            <a:r>
-              <a:rPr lang="en-GB" sz="2000" b="1" dirty="0">
-                <a:latin typeface="Euphemia UCAS" panose="020B0503040102020104" pitchFamily="34" charset="-79"/>
-                <a:ea typeface="Apple Color Emoji" pitchFamily="2" charset="0"/>
-                <a:cs typeface="Euphemia UCAS" panose="020B0503040102020104" pitchFamily="34" charset="-79"/>
-              </a:rPr>
-              <a:t>)</a:t>
-            </a:r>
-          </a:p>
-          <a:p>
-            <a:pPr marL="742950" lvl="1" indent="-285750">
-              <a:buFont typeface="Arial" panose="020B0604020202020204" pitchFamily="34" charset="0"/>
-              <a:buChar char="•"/>
-            </a:pPr>
-            <a:r>
-              <a:rPr lang="en-GB" sz="1600" dirty="0">
-                <a:latin typeface="Euphemia UCAS" panose="020B0503040102020104" pitchFamily="34" charset="-79"/>
-                <a:ea typeface="Apple Color Emoji" pitchFamily="2" charset="0"/>
-                <a:cs typeface="Euphemia UCAS" panose="020B0503040102020104" pitchFamily="34" charset="-79"/>
-              </a:rPr>
-              <a:t>shuffles the order of the elements contained in the list</a:t>
-            </a:r>
-          </a:p>
-        </p:txBody>
-      </p:sp>
-      <p:sp>
-        <p:nvSpPr>
-          <p:cNvPr id="8" name="Textfeld 7">
-            <a:extLst>
-              <a:ext uri="{FF2B5EF4-FFF2-40B4-BE49-F238E27FC236}">
-                <a16:creationId xmlns:a16="http://schemas.microsoft.com/office/drawing/2014/main" id="{481603E3-CDE3-554C-BA0F-88261010E5A4}"/>
-              </a:ext>
-            </a:extLst>
-          </p:cNvPr>
-          <p:cNvSpPr txBox="1"/>
-          <p:nvPr/>
-        </p:nvSpPr>
-        <p:spPr>
-          <a:xfrm>
-            <a:off x="5239913" y="1943890"/>
-            <a:ext cx="6423553" cy="892552"/>
-          </a:xfrm>
-          <a:prstGeom prst="rect">
-            <a:avLst/>
-          </a:prstGeom>
-          <a:solidFill>
-            <a:schemeClr val="accent4">
-              <a:lumMod val="60000"/>
-              <a:lumOff val="40000"/>
-            </a:schemeClr>
-          </a:solidFill>
-          <a:ln w="38100">
-            <a:solidFill>
-              <a:schemeClr val="bg1"/>
-            </a:solidFill>
-          </a:ln>
-        </p:spPr>
-        <p:txBody>
-          <a:bodyPr wrap="square" rtlCol="0">
-            <a:spAutoFit/>
-          </a:bodyPr>
-          <a:lstStyle/>
-          <a:p>
-            <a:r>
-              <a:rPr lang="en-GB" sz="2000" dirty="0" err="1">
-                <a:latin typeface="Euphemia UCAS" panose="020B0503040102020104" pitchFamily="34" charset="-79"/>
-                <a:ea typeface="Apple Color Emoji" pitchFamily="2" charset="0"/>
-                <a:cs typeface="Euphemia UCAS" panose="020B0503040102020104" pitchFamily="34" charset="-79"/>
-              </a:rPr>
-              <a:t>random.</a:t>
-            </a:r>
-            <a:r>
-              <a:rPr lang="en-GB" sz="2000" b="1" dirty="0" err="1">
-                <a:latin typeface="Euphemia UCAS" panose="020B0503040102020104" pitchFamily="34" charset="-79"/>
-                <a:ea typeface="Apple Color Emoji" pitchFamily="2" charset="0"/>
-                <a:cs typeface="Euphemia UCAS" panose="020B0503040102020104" pitchFamily="34" charset="-79"/>
-              </a:rPr>
-              <a:t>choice</a:t>
-            </a:r>
-            <a:r>
-              <a:rPr lang="en-GB" sz="2000" b="1" dirty="0">
-                <a:latin typeface="Euphemia UCAS" panose="020B0503040102020104" pitchFamily="34" charset="-79"/>
-                <a:ea typeface="Apple Color Emoji" pitchFamily="2" charset="0"/>
-                <a:cs typeface="Euphemia UCAS" panose="020B0503040102020104" pitchFamily="34" charset="-79"/>
-              </a:rPr>
-              <a:t>(</a:t>
-            </a:r>
-            <a:r>
-              <a:rPr lang="en-GB" sz="1400" dirty="0" err="1">
-                <a:latin typeface="Euphemia UCAS" panose="020B0503040102020104" pitchFamily="34" charset="-79"/>
-                <a:ea typeface="Apple Color Emoji" pitchFamily="2" charset="0"/>
-                <a:cs typeface="Euphemia UCAS" panose="020B0503040102020104" pitchFamily="34" charset="-79"/>
-              </a:rPr>
-              <a:t>some_sequence</a:t>
-            </a:r>
-            <a:r>
-              <a:rPr lang="en-GB" sz="2000" b="1" dirty="0">
-                <a:latin typeface="Euphemia UCAS" panose="020B0503040102020104" pitchFamily="34" charset="-79"/>
-                <a:ea typeface="Apple Color Emoji" pitchFamily="2" charset="0"/>
-                <a:cs typeface="Euphemia UCAS" panose="020B0503040102020104" pitchFamily="34" charset="-79"/>
-              </a:rPr>
-              <a:t>)</a:t>
-            </a:r>
-          </a:p>
-          <a:p>
-            <a:pPr marL="742950" lvl="1" indent="-285750">
-              <a:buFont typeface="Arial" panose="020B0604020202020204" pitchFamily="34" charset="0"/>
-              <a:buChar char="•"/>
-            </a:pPr>
-            <a:r>
-              <a:rPr lang="en-GB" sz="1600" dirty="0">
-                <a:latin typeface="Euphemia UCAS" panose="020B0503040102020104" pitchFamily="34" charset="-79"/>
-                <a:ea typeface="Apple Color Emoji" pitchFamily="2" charset="0"/>
-                <a:cs typeface="Euphemia UCAS" panose="020B0503040102020104" pitchFamily="34" charset="-79"/>
-              </a:rPr>
-              <a:t>returns one random element from the sequence</a:t>
-            </a:r>
-          </a:p>
-          <a:p>
-            <a:pPr marL="742950" lvl="1" indent="-285750">
-              <a:buFont typeface="Arial" panose="020B0604020202020204" pitchFamily="34" charset="0"/>
-              <a:buChar char="•"/>
-            </a:pPr>
-            <a:r>
-              <a:rPr lang="en-GB" sz="1600" dirty="0">
-                <a:latin typeface="Euphemia UCAS" panose="020B0503040102020104" pitchFamily="34" charset="-79"/>
-                <a:ea typeface="Apple Color Emoji" pitchFamily="2" charset="0"/>
-                <a:cs typeface="Euphemia UCAS" panose="020B0503040102020104" pitchFamily="34" charset="-79"/>
-              </a:rPr>
-              <a:t>sequence could be list, tuple, … </a:t>
-            </a:r>
-          </a:p>
-        </p:txBody>
-      </p:sp>
-      <p:sp>
-        <p:nvSpPr>
-          <p:cNvPr id="9" name="Textfeld 8">
-            <a:extLst>
-              <a:ext uri="{FF2B5EF4-FFF2-40B4-BE49-F238E27FC236}">
-                <a16:creationId xmlns:a16="http://schemas.microsoft.com/office/drawing/2014/main" id="{C855AD42-918E-2D42-AF71-42FE6D5771A8}"/>
-              </a:ext>
-            </a:extLst>
-          </p:cNvPr>
-          <p:cNvSpPr txBox="1"/>
-          <p:nvPr/>
-        </p:nvSpPr>
-        <p:spPr>
-          <a:xfrm>
-            <a:off x="5239913" y="3036497"/>
-            <a:ext cx="6423553" cy="892552"/>
-          </a:xfrm>
-          <a:prstGeom prst="rect">
-            <a:avLst/>
-          </a:prstGeom>
-          <a:solidFill>
-            <a:schemeClr val="accent4">
-              <a:lumMod val="60000"/>
-              <a:lumOff val="40000"/>
-            </a:schemeClr>
-          </a:solidFill>
-          <a:ln w="38100">
-            <a:solidFill>
-              <a:schemeClr val="bg1"/>
-            </a:solidFill>
-          </a:ln>
-        </p:spPr>
-        <p:txBody>
-          <a:bodyPr wrap="square" rtlCol="0">
-            <a:spAutoFit/>
-          </a:bodyPr>
-          <a:lstStyle/>
-          <a:p>
-            <a:r>
-              <a:rPr lang="en-GB" sz="2000" dirty="0" err="1">
-                <a:latin typeface="Euphemia UCAS" panose="020B0503040102020104" pitchFamily="34" charset="-79"/>
-                <a:ea typeface="Apple Color Emoji" pitchFamily="2" charset="0"/>
-                <a:cs typeface="Euphemia UCAS" panose="020B0503040102020104" pitchFamily="34" charset="-79"/>
-              </a:rPr>
-              <a:t>random.</a:t>
-            </a:r>
-            <a:r>
-              <a:rPr lang="en-GB" sz="2000" b="1" dirty="0" err="1">
-                <a:latin typeface="Euphemia UCAS" panose="020B0503040102020104" pitchFamily="34" charset="-79"/>
-                <a:ea typeface="Apple Color Emoji" pitchFamily="2" charset="0"/>
-                <a:cs typeface="Euphemia UCAS" panose="020B0503040102020104" pitchFamily="34" charset="-79"/>
-              </a:rPr>
-              <a:t>choices</a:t>
-            </a:r>
-            <a:r>
-              <a:rPr lang="en-GB" sz="2000" b="1" dirty="0">
-                <a:latin typeface="Euphemia UCAS" panose="020B0503040102020104" pitchFamily="34" charset="-79"/>
-                <a:ea typeface="Apple Color Emoji" pitchFamily="2" charset="0"/>
-                <a:cs typeface="Euphemia UCAS" panose="020B0503040102020104" pitchFamily="34" charset="-79"/>
-              </a:rPr>
-              <a:t>(</a:t>
-            </a:r>
-            <a:r>
-              <a:rPr lang="en-GB" sz="1400" dirty="0" err="1">
-                <a:latin typeface="Euphemia UCAS" panose="020B0503040102020104" pitchFamily="34" charset="-79"/>
-                <a:ea typeface="Apple Color Emoji" pitchFamily="2" charset="0"/>
-                <a:cs typeface="Euphemia UCAS" panose="020B0503040102020104" pitchFamily="34" charset="-79"/>
-              </a:rPr>
-              <a:t>some_sequence</a:t>
-            </a:r>
-            <a:r>
-              <a:rPr lang="en-GB" sz="1400" dirty="0">
-                <a:latin typeface="Euphemia UCAS" panose="020B0503040102020104" pitchFamily="34" charset="-79"/>
-                <a:ea typeface="Apple Color Emoji" pitchFamily="2" charset="0"/>
-                <a:cs typeface="Euphemia UCAS" panose="020B0503040102020104" pitchFamily="34" charset="-79"/>
-              </a:rPr>
-              <a:t>, k=</a:t>
-            </a:r>
-            <a:r>
-              <a:rPr lang="en-GB" sz="1400" dirty="0" err="1">
-                <a:latin typeface="Euphemia UCAS" panose="020B0503040102020104" pitchFamily="34" charset="-79"/>
-                <a:ea typeface="Apple Color Emoji" pitchFamily="2" charset="0"/>
-                <a:cs typeface="Euphemia UCAS" panose="020B0503040102020104" pitchFamily="34" charset="-79"/>
-              </a:rPr>
-              <a:t>numer_of_elements_to_draw</a:t>
-            </a:r>
-            <a:r>
-              <a:rPr lang="en-GB" sz="2000" b="1" dirty="0">
-                <a:latin typeface="Euphemia UCAS" panose="020B0503040102020104" pitchFamily="34" charset="-79"/>
-                <a:ea typeface="Apple Color Emoji" pitchFamily="2" charset="0"/>
-                <a:cs typeface="Euphemia UCAS" panose="020B0503040102020104" pitchFamily="34" charset="-79"/>
-              </a:rPr>
-              <a:t>)</a:t>
-            </a:r>
-          </a:p>
-          <a:p>
-            <a:pPr marL="742950" lvl="1" indent="-285750">
-              <a:buFont typeface="Arial" panose="020B0604020202020204" pitchFamily="34" charset="0"/>
-              <a:buChar char="•"/>
-            </a:pPr>
-            <a:r>
-              <a:rPr lang="en-GB" sz="1600" dirty="0">
-                <a:latin typeface="Euphemia UCAS" panose="020B0503040102020104" pitchFamily="34" charset="-79"/>
-                <a:ea typeface="Apple Color Emoji" pitchFamily="2" charset="0"/>
-                <a:cs typeface="Euphemia UCAS" panose="020B0503040102020104" pitchFamily="34" charset="-79"/>
-              </a:rPr>
-              <a:t>returns </a:t>
-            </a:r>
-            <a:r>
-              <a:rPr lang="en-GB" sz="1600" i="1" dirty="0">
-                <a:latin typeface="Euphemia UCAS" panose="020B0503040102020104" pitchFamily="34" charset="-79"/>
-                <a:ea typeface="Apple Color Emoji" pitchFamily="2" charset="0"/>
-                <a:cs typeface="Euphemia UCAS" panose="020B0503040102020104" pitchFamily="34" charset="-79"/>
-              </a:rPr>
-              <a:t>k</a:t>
-            </a:r>
-            <a:r>
-              <a:rPr lang="en-GB" sz="1600" dirty="0">
-                <a:latin typeface="Euphemia UCAS" panose="020B0503040102020104" pitchFamily="34" charset="-79"/>
-                <a:ea typeface="Apple Color Emoji" pitchFamily="2" charset="0"/>
-                <a:cs typeface="Euphemia UCAS" panose="020B0503040102020104" pitchFamily="34" charset="-79"/>
-              </a:rPr>
-              <a:t> random elements from the sequence</a:t>
-            </a:r>
-          </a:p>
-          <a:p>
-            <a:pPr marL="742950" lvl="1" indent="-285750">
-              <a:buFont typeface="Arial" panose="020B0604020202020204" pitchFamily="34" charset="0"/>
-              <a:buChar char="•"/>
-            </a:pPr>
-            <a:r>
-              <a:rPr lang="en-GB" sz="1600" dirty="0">
-                <a:latin typeface="Euphemia UCAS" panose="020B0503040102020104" pitchFamily="34" charset="-79"/>
-                <a:ea typeface="Apple Color Emoji" pitchFamily="2" charset="0"/>
-                <a:cs typeface="Euphemia UCAS" panose="020B0503040102020104" pitchFamily="34" charset="-79"/>
-              </a:rPr>
-              <a:t>sequence could be list, tuple, … </a:t>
-            </a:r>
-          </a:p>
-        </p:txBody>
-      </p:sp>
-      <p:sp>
-        <p:nvSpPr>
-          <p:cNvPr id="10" name="Textfeld 9">
-            <a:extLst>
-              <a:ext uri="{FF2B5EF4-FFF2-40B4-BE49-F238E27FC236}">
-                <a16:creationId xmlns:a16="http://schemas.microsoft.com/office/drawing/2014/main" id="{124F2F62-C9CC-4A4C-964C-C5BBA3FEB662}"/>
-              </a:ext>
-            </a:extLst>
-          </p:cNvPr>
-          <p:cNvSpPr txBox="1"/>
-          <p:nvPr/>
-        </p:nvSpPr>
-        <p:spPr>
-          <a:xfrm>
-            <a:off x="5239913" y="4350109"/>
-            <a:ext cx="6423553" cy="892552"/>
-          </a:xfrm>
-          <a:prstGeom prst="rect">
-            <a:avLst/>
-          </a:prstGeom>
-          <a:solidFill>
-            <a:schemeClr val="accent4">
-              <a:lumMod val="60000"/>
-              <a:lumOff val="40000"/>
-            </a:schemeClr>
-          </a:solidFill>
-          <a:ln w="38100">
-            <a:solidFill>
-              <a:schemeClr val="bg1"/>
-            </a:solidFill>
-          </a:ln>
-        </p:spPr>
-        <p:txBody>
-          <a:bodyPr wrap="square" rtlCol="0">
-            <a:spAutoFit/>
-          </a:bodyPr>
-          <a:lstStyle/>
-          <a:p>
-            <a:r>
-              <a:rPr lang="en-GB" sz="2000" dirty="0" err="1">
-                <a:latin typeface="Euphemia UCAS" panose="020B0503040102020104" pitchFamily="34" charset="-79"/>
-                <a:ea typeface="Apple Color Emoji" pitchFamily="2" charset="0"/>
-                <a:cs typeface="Euphemia UCAS" panose="020B0503040102020104" pitchFamily="34" charset="-79"/>
-              </a:rPr>
-              <a:t>random.</a:t>
-            </a:r>
-            <a:r>
-              <a:rPr lang="en-GB" sz="2000" b="1" dirty="0" err="1">
-                <a:latin typeface="Euphemia UCAS" panose="020B0503040102020104" pitchFamily="34" charset="-79"/>
-                <a:ea typeface="Apple Color Emoji" pitchFamily="2" charset="0"/>
-                <a:cs typeface="Euphemia UCAS" panose="020B0503040102020104" pitchFamily="34" charset="-79"/>
-              </a:rPr>
-              <a:t>seed</a:t>
-            </a:r>
-            <a:r>
-              <a:rPr lang="en-GB" sz="2000" b="1" dirty="0">
-                <a:latin typeface="Euphemia UCAS" panose="020B0503040102020104" pitchFamily="34" charset="-79"/>
-                <a:ea typeface="Apple Color Emoji" pitchFamily="2" charset="0"/>
-                <a:cs typeface="Euphemia UCAS" panose="020B0503040102020104" pitchFamily="34" charset="-79"/>
-              </a:rPr>
-              <a:t>(</a:t>
-            </a:r>
-            <a:r>
-              <a:rPr lang="en-GB" sz="1400" dirty="0" err="1">
-                <a:latin typeface="Euphemia UCAS" panose="020B0503040102020104" pitchFamily="34" charset="-79"/>
-                <a:ea typeface="Apple Color Emoji" pitchFamily="2" charset="0"/>
-                <a:cs typeface="Euphemia UCAS" panose="020B0503040102020104" pitchFamily="34" charset="-79"/>
-              </a:rPr>
-              <a:t>some_number</a:t>
-            </a:r>
-            <a:r>
-              <a:rPr lang="en-GB" sz="2000" b="1" dirty="0">
-                <a:latin typeface="Euphemia UCAS" panose="020B0503040102020104" pitchFamily="34" charset="-79"/>
-                <a:ea typeface="Apple Color Emoji" pitchFamily="2" charset="0"/>
-                <a:cs typeface="Euphemia UCAS" panose="020B0503040102020104" pitchFamily="34" charset="-79"/>
-              </a:rPr>
-              <a:t>)</a:t>
-            </a:r>
-          </a:p>
-          <a:p>
-            <a:pPr marL="742950" lvl="1" indent="-285750">
-              <a:buFont typeface="Arial" panose="020B0604020202020204" pitchFamily="34" charset="0"/>
-              <a:buChar char="•"/>
-            </a:pPr>
-            <a:r>
-              <a:rPr lang="en-GB" sz="1600" dirty="0">
-                <a:latin typeface="Euphemia UCAS" panose="020B0503040102020104" pitchFamily="34" charset="-79"/>
-                <a:ea typeface="Apple Color Emoji" pitchFamily="2" charset="0"/>
-                <a:cs typeface="Euphemia UCAS" panose="020B0503040102020104" pitchFamily="34" charset="-79"/>
-              </a:rPr>
-              <a:t>returns </a:t>
-            </a:r>
-            <a:r>
-              <a:rPr lang="en-GB" sz="1600" i="1" dirty="0">
-                <a:latin typeface="Euphemia UCAS" panose="020B0503040102020104" pitchFamily="34" charset="-79"/>
-                <a:ea typeface="Apple Color Emoji" pitchFamily="2" charset="0"/>
-                <a:cs typeface="Euphemia UCAS" panose="020B0503040102020104" pitchFamily="34" charset="-79"/>
-              </a:rPr>
-              <a:t>k</a:t>
-            </a:r>
-            <a:r>
-              <a:rPr lang="en-GB" sz="1600" dirty="0">
-                <a:latin typeface="Euphemia UCAS" panose="020B0503040102020104" pitchFamily="34" charset="-79"/>
-                <a:ea typeface="Apple Color Emoji" pitchFamily="2" charset="0"/>
-                <a:cs typeface="Euphemia UCAS" panose="020B0503040102020104" pitchFamily="34" charset="-79"/>
-              </a:rPr>
-              <a:t> random elements from the sequence</a:t>
-            </a:r>
-          </a:p>
-          <a:p>
-            <a:pPr marL="742950" lvl="1" indent="-285750">
-              <a:buFont typeface="Arial" panose="020B0604020202020204" pitchFamily="34" charset="0"/>
-              <a:buChar char="•"/>
-            </a:pPr>
-            <a:r>
-              <a:rPr lang="en-GB" sz="1600" dirty="0">
-                <a:latin typeface="Euphemia UCAS" panose="020B0503040102020104" pitchFamily="34" charset="-79"/>
-                <a:ea typeface="Apple Color Emoji" pitchFamily="2" charset="0"/>
-                <a:cs typeface="Euphemia UCAS" panose="020B0503040102020104" pitchFamily="34" charset="-79"/>
-              </a:rPr>
-              <a:t>sequence could be list, tuple, … </a:t>
-            </a:r>
-          </a:p>
-        </p:txBody>
-      </p:sp>
-      <p:sp>
-        <p:nvSpPr>
-          <p:cNvPr id="5" name="Textfeld 4">
-            <a:extLst>
-              <a:ext uri="{FF2B5EF4-FFF2-40B4-BE49-F238E27FC236}">
-                <a16:creationId xmlns:a16="http://schemas.microsoft.com/office/drawing/2014/main" id="{3A7605B5-1312-5841-9408-CE8A4EB61687}"/>
-              </a:ext>
-            </a:extLst>
-          </p:cNvPr>
-          <p:cNvSpPr txBox="1"/>
-          <p:nvPr/>
-        </p:nvSpPr>
-        <p:spPr>
-          <a:xfrm>
-            <a:off x="5239913" y="5294389"/>
-            <a:ext cx="4464107" cy="369332"/>
-          </a:xfrm>
-          <a:prstGeom prst="rect">
-            <a:avLst/>
-          </a:prstGeom>
-          <a:noFill/>
-        </p:spPr>
-        <p:txBody>
-          <a:bodyPr wrap="none" rtlCol="0">
-            <a:spAutoFit/>
-          </a:bodyPr>
-          <a:lstStyle/>
-          <a:p>
-            <a:r>
-              <a:rPr lang="en-GB" dirty="0">
-                <a:solidFill>
-                  <a:schemeClr val="bg1"/>
-                </a:solidFill>
-              </a:rPr>
-              <a:t>What pseudo-random number generators do:</a:t>
-            </a:r>
-          </a:p>
-        </p:txBody>
-      </p:sp>
-      <p:sp>
-        <p:nvSpPr>
-          <p:cNvPr id="11" name="Textfeld 10">
-            <a:extLst>
-              <a:ext uri="{FF2B5EF4-FFF2-40B4-BE49-F238E27FC236}">
-                <a16:creationId xmlns:a16="http://schemas.microsoft.com/office/drawing/2014/main" id="{72504D11-401F-C64F-B7E9-5C58B298C340}"/>
-              </a:ext>
-            </a:extLst>
-          </p:cNvPr>
-          <p:cNvSpPr txBox="1"/>
-          <p:nvPr/>
-        </p:nvSpPr>
-        <p:spPr>
-          <a:xfrm>
-            <a:off x="5239913" y="5844192"/>
-            <a:ext cx="5804794" cy="646331"/>
-          </a:xfrm>
-          <a:prstGeom prst="rect">
-            <a:avLst/>
-          </a:prstGeom>
-          <a:noFill/>
-        </p:spPr>
-        <p:txBody>
-          <a:bodyPr wrap="none" rtlCol="0">
-            <a:spAutoFit/>
-          </a:bodyPr>
-          <a:lstStyle/>
-          <a:p>
-            <a:r>
-              <a:rPr lang="en-GB" dirty="0">
-                <a:solidFill>
-                  <a:schemeClr val="bg1"/>
-                </a:solidFill>
-              </a:rPr>
-              <a:t>number     ⟹   </a:t>
-            </a:r>
-            <a:r>
-              <a:rPr lang="en-GB" dirty="0" err="1">
-                <a:solidFill>
-                  <a:schemeClr val="bg1"/>
-                </a:solidFill>
-              </a:rPr>
-              <a:t>do_this</a:t>
-            </a:r>
-            <a:r>
-              <a:rPr lang="en-GB" dirty="0">
-                <a:solidFill>
-                  <a:schemeClr val="bg1"/>
-                </a:solidFill>
-              </a:rPr>
-              <a:t>(number) ⟹ </a:t>
-            </a:r>
-            <a:r>
-              <a:rPr lang="en-GB" dirty="0" err="1">
-                <a:solidFill>
-                  <a:schemeClr val="bg1"/>
-                </a:solidFill>
-              </a:rPr>
-              <a:t>do_than</a:t>
-            </a:r>
-            <a:r>
-              <a:rPr lang="en-GB" dirty="0">
-                <a:solidFill>
-                  <a:schemeClr val="bg1"/>
-                </a:solidFill>
-              </a:rPr>
-              <a:t>(number) ⟹ … </a:t>
-            </a:r>
-          </a:p>
-          <a:p>
-            <a:r>
-              <a:rPr lang="en-GB" dirty="0">
-                <a:solidFill>
-                  <a:schemeClr val="bg1"/>
-                </a:solidFill>
-              </a:rPr>
-              <a:t>                    ➥ return random other number</a:t>
-            </a:r>
-          </a:p>
-        </p:txBody>
-      </p:sp>
-      <p:sp>
-        <p:nvSpPr>
-          <p:cNvPr id="12" name="Oval 11">
-            <a:extLst>
-              <a:ext uri="{FF2B5EF4-FFF2-40B4-BE49-F238E27FC236}">
-                <a16:creationId xmlns:a16="http://schemas.microsoft.com/office/drawing/2014/main" id="{A235A7BA-FB49-DF46-9262-B789D5BA20F5}"/>
-              </a:ext>
-            </a:extLst>
-          </p:cNvPr>
-          <p:cNvSpPr/>
-          <p:nvPr/>
-        </p:nvSpPr>
-        <p:spPr>
-          <a:xfrm>
-            <a:off x="5229155" y="5844192"/>
-            <a:ext cx="934976" cy="416759"/>
-          </a:xfrm>
-          <a:prstGeom prst="ellipse">
-            <a:avLst/>
-          </a:prstGeom>
-          <a:noFill/>
-          <a:ln w="28575">
-            <a:solidFill>
-              <a:schemeClr val="accent4">
-                <a:lumMod val="60000"/>
-                <a:lumOff val="40000"/>
-              </a:schemeClr>
-            </a:solidFill>
-          </a:ln>
-        </p:spPr>
-        <p:style>
-          <a:lnRef idx="2">
-            <a:schemeClr val="accent1">
-              <a:shade val="50000"/>
-            </a:schemeClr>
-          </a:lnRef>
-          <a:fillRef idx="1">
-            <a:schemeClr val="accent1"/>
-          </a:fillRef>
-          <a:effectRef idx="0">
-            <a:schemeClr val="accent1"/>
-          </a:effectRef>
-          <a:fontRef idx="minor">
-            <a:schemeClr val="lt1"/>
-          </a:fontRef>
-        </p:style>
-        <p:txBody>
-          <a:bodyPr rtlCol="0" anchor="ctr"/>
-          <a:lstStyle/>
-          <a:p>
-            <a:pPr algn="ctr"/>
-            <a:endParaRPr lang="en-GB"/>
-          </a:p>
-        </p:txBody>
-      </p:sp>
-      <p:sp>
-        <p:nvSpPr>
-          <p:cNvPr id="13" name="Textfeld 12">
-            <a:extLst>
-              <a:ext uri="{FF2B5EF4-FFF2-40B4-BE49-F238E27FC236}">
-                <a16:creationId xmlns:a16="http://schemas.microsoft.com/office/drawing/2014/main" id="{7951530D-7495-7A48-A4D8-813FAFF8A39C}"/>
-              </a:ext>
-            </a:extLst>
-          </p:cNvPr>
-          <p:cNvSpPr txBox="1"/>
-          <p:nvPr/>
-        </p:nvSpPr>
-        <p:spPr>
-          <a:xfrm rot="20353708">
-            <a:off x="5024437" y="6136782"/>
-            <a:ext cx="627095" cy="369332"/>
-          </a:xfrm>
-          <a:prstGeom prst="rect">
-            <a:avLst/>
-          </a:prstGeom>
-          <a:noFill/>
-        </p:spPr>
-        <p:txBody>
-          <a:bodyPr wrap="none" rtlCol="0">
-            <a:spAutoFit/>
-          </a:bodyPr>
-          <a:lstStyle/>
-          <a:p>
-            <a:r>
-              <a:rPr lang="en-GB" dirty="0">
-                <a:solidFill>
-                  <a:schemeClr val="accent4">
-                    <a:lumMod val="60000"/>
-                    <a:lumOff val="40000"/>
-                  </a:schemeClr>
-                </a:solidFill>
-              </a:rPr>
-              <a:t>seed</a:t>
-            </a:r>
-          </a:p>
-        </p:txBody>
-      </p:sp>
-      <p:sp>
-        <p:nvSpPr>
-          <p:cNvPr id="14" name="Oval 13">
-            <a:extLst>
-              <a:ext uri="{FF2B5EF4-FFF2-40B4-BE49-F238E27FC236}">
-                <a16:creationId xmlns:a16="http://schemas.microsoft.com/office/drawing/2014/main" id="{4306CEF1-82C2-DA4C-8F68-087FC5A06608}"/>
-              </a:ext>
-            </a:extLst>
-          </p:cNvPr>
-          <p:cNvSpPr/>
-          <p:nvPr/>
-        </p:nvSpPr>
-        <p:spPr>
-          <a:xfrm>
-            <a:off x="6250193" y="5663720"/>
-            <a:ext cx="4794514" cy="1038293"/>
-          </a:xfrm>
-          <a:prstGeom prst="ellipse">
-            <a:avLst/>
-          </a:prstGeom>
-          <a:noFill/>
-          <a:ln w="28575">
-            <a:solidFill>
-              <a:schemeClr val="accent4">
-                <a:lumMod val="60000"/>
-                <a:lumOff val="40000"/>
-              </a:schemeClr>
-            </a:solidFill>
-          </a:ln>
-        </p:spPr>
-        <p:style>
-          <a:lnRef idx="2">
-            <a:schemeClr val="accent1">
-              <a:shade val="50000"/>
-            </a:schemeClr>
-          </a:lnRef>
-          <a:fillRef idx="1">
-            <a:schemeClr val="accent1"/>
-          </a:fillRef>
-          <a:effectRef idx="0">
-            <a:schemeClr val="accent1"/>
-          </a:effectRef>
-          <a:fontRef idx="minor">
-            <a:schemeClr val="lt1"/>
-          </a:fontRef>
-        </p:style>
-        <p:txBody>
-          <a:bodyPr rtlCol="0" anchor="ctr"/>
-          <a:lstStyle/>
-          <a:p>
-            <a:pPr algn="ctr"/>
-            <a:endParaRPr lang="en-GB"/>
-          </a:p>
-        </p:txBody>
-      </p:sp>
-      <p:sp>
-        <p:nvSpPr>
-          <p:cNvPr id="15" name="Textfeld 14">
-            <a:extLst>
-              <a:ext uri="{FF2B5EF4-FFF2-40B4-BE49-F238E27FC236}">
-                <a16:creationId xmlns:a16="http://schemas.microsoft.com/office/drawing/2014/main" id="{F77CE449-762C-BA47-A7A0-8B1A91FA5403}"/>
-              </a:ext>
-            </a:extLst>
-          </p:cNvPr>
-          <p:cNvSpPr txBox="1"/>
-          <p:nvPr/>
-        </p:nvSpPr>
-        <p:spPr>
-          <a:xfrm rot="422791">
-            <a:off x="10583985" y="5406240"/>
-            <a:ext cx="1093569" cy="646331"/>
-          </a:xfrm>
-          <a:prstGeom prst="rect">
-            <a:avLst/>
-          </a:prstGeom>
-          <a:noFill/>
-        </p:spPr>
-        <p:txBody>
-          <a:bodyPr wrap="none" rtlCol="0">
-            <a:spAutoFit/>
-          </a:bodyPr>
-          <a:lstStyle/>
-          <a:p>
-            <a:r>
-              <a:rPr lang="en-GB" dirty="0">
-                <a:solidFill>
-                  <a:schemeClr val="accent4">
-                    <a:lumMod val="60000"/>
-                    <a:lumOff val="40000"/>
-                  </a:schemeClr>
-                </a:solidFill>
-              </a:rPr>
-              <a:t>some </a:t>
-            </a:r>
-          </a:p>
-          <a:p>
-            <a:r>
-              <a:rPr lang="en-GB" dirty="0">
-                <a:solidFill>
-                  <a:schemeClr val="accent4">
-                    <a:lumMod val="60000"/>
-                    <a:lumOff val="40000"/>
-                  </a:schemeClr>
-                </a:solidFill>
-              </a:rPr>
-              <a:t>algorithm</a:t>
-            </a:r>
-          </a:p>
-        </p:txBody>
-      </p:sp>
-      <p:sp>
-        <p:nvSpPr>
-          <p:cNvPr id="16" name="Textfeld 15">
-            <a:extLst>
-              <a:ext uri="{FF2B5EF4-FFF2-40B4-BE49-F238E27FC236}">
-                <a16:creationId xmlns:a16="http://schemas.microsoft.com/office/drawing/2014/main" id="{2C470360-A9A6-C343-91D6-B44B8C76EE68}"/>
-              </a:ext>
-            </a:extLst>
-          </p:cNvPr>
-          <p:cNvSpPr txBox="1"/>
-          <p:nvPr/>
-        </p:nvSpPr>
-        <p:spPr>
-          <a:xfrm>
-            <a:off x="528533" y="2667165"/>
-            <a:ext cx="4450793" cy="3693319"/>
-          </a:xfrm>
-          <a:prstGeom prst="rect">
-            <a:avLst/>
-          </a:prstGeom>
-          <a:noFill/>
-        </p:spPr>
-        <p:txBody>
-          <a:bodyPr wrap="square" rtlCol="0">
-            <a:spAutoFit/>
-          </a:bodyPr>
-          <a:lstStyle/>
-          <a:p>
-            <a:r>
-              <a:rPr lang="en-GB" b="1" dirty="0">
-                <a:solidFill>
-                  <a:schemeClr val="bg1"/>
-                </a:solidFill>
-              </a:rPr>
-              <a:t>Task: Let chance decide whether each subject gets assigned to condition A or B. Create a second list which will be shown to subjects instead, if they are in condition B instead of A. </a:t>
-            </a:r>
-          </a:p>
-          <a:p>
-            <a:endParaRPr lang="en-GB" b="1" dirty="0">
-              <a:solidFill>
-                <a:schemeClr val="bg1"/>
-              </a:solidFill>
-            </a:endParaRPr>
-          </a:p>
-          <a:p>
-            <a:r>
-              <a:rPr lang="en-GB" b="1" dirty="0">
-                <a:solidFill>
-                  <a:schemeClr val="bg1"/>
-                </a:solidFill>
-              </a:rPr>
-              <a:t>Task: Shuffle the order of your stimuli before presenting them.</a:t>
-            </a:r>
-          </a:p>
-          <a:p>
-            <a:endParaRPr lang="en-GB" b="1" dirty="0">
-              <a:solidFill>
-                <a:schemeClr val="bg1"/>
-              </a:solidFill>
-            </a:endParaRPr>
-          </a:p>
-          <a:p>
-            <a:r>
-              <a:rPr lang="en-GB" b="1" dirty="0">
-                <a:solidFill>
-                  <a:schemeClr val="bg1"/>
-                </a:solidFill>
-              </a:rPr>
-              <a:t>Task: Shuffle a list of 10 letters (each represented three times in the sequence) until no letter gets repeated in the new pseudo-random sequence. </a:t>
-            </a:r>
-          </a:p>
-        </p:txBody>
-      </p:sp>
-    </p:spTree>
-    <p:extLst>
-      <p:ext uri="{BB962C8B-B14F-4D97-AF65-F5344CB8AC3E}">
-        <p14:creationId xmlns:p14="http://schemas.microsoft.com/office/powerpoint/2010/main" val="4022237247"/>
-      </p:ext>
-    </p:extLst>
-  </p:cSld>
-  <p:clrMapOvr>
-    <a:masterClrMapping/>
-  </p:clrMapOvr>
-</p:sld>
-</file>
-
-<file path=ppt/slides/slide7.xml><?xml version="1.0" encoding="utf-8"?>
-<p:sld xmlns:a="http://schemas.openxmlformats.org/drawingml/2006/main" xmlns:r="http://schemas.openxmlformats.org/officeDocument/2006/relationships" xmlns:p="http://schemas.openxmlformats.org/presentationml/2006/main">
-  <p:cSld>
-    <p:bg>
-      <p:bgPr>
-        <a:solidFill>
-          <a:srgbClr val="23537A"/>
-        </a:solidFill>
-        <a:effectLst/>
-      </p:bgPr>
-    </p:bg>
-    <p:spTree>
-      <p:nvGrpSpPr>
-        <p:cNvPr id="1" name=""/>
-        <p:cNvGrpSpPr/>
-        <p:nvPr/>
-      </p:nvGrpSpPr>
-      <p:grpSpPr>
-        <a:xfrm>
-          <a:off x="0" y="0"/>
-          <a:ext cx="0" cy="0"/>
-          <a:chOff x="0" y="0"/>
-          <a:chExt cx="0" cy="0"/>
-        </a:xfrm>
-      </p:grpSpPr>
-      <p:sp>
-        <p:nvSpPr>
-          <p:cNvPr id="6" name="Titel 5">
-            <a:extLst>
-              <a:ext uri="{FF2B5EF4-FFF2-40B4-BE49-F238E27FC236}">
-                <a16:creationId xmlns:a16="http://schemas.microsoft.com/office/drawing/2014/main" id="{739080D7-639A-8743-9560-B2A024EFF8FF}"/>
-              </a:ext>
-            </a:extLst>
-          </p:cNvPr>
-          <p:cNvSpPr>
-            <a:spLocks noGrp="1"/>
-          </p:cNvSpPr>
-          <p:nvPr>
-            <p:ph type="title"/>
-          </p:nvPr>
-        </p:nvSpPr>
         <p:spPr/>
         <p:txBody>
           <a:bodyPr/>
@@ -6858,7 +5870,7 @@
         <p:spPr>
           <a:xfrm>
             <a:off x="6541119" y="4871069"/>
-            <a:ext cx="3352200" cy="184666"/>
+            <a:ext cx="4918334" cy="230832"/>
           </a:xfrm>
           <a:prstGeom prst="rect">
             <a:avLst/>
@@ -6872,7 +5884,7 @@
           <a:lstStyle/>
           <a:p>
             <a:r>
-              <a:rPr lang="en-GB" sz="600" dirty="0">
+              <a:rPr lang="en-GB" sz="900" dirty="0">
                 <a:solidFill>
                   <a:schemeClr val="bg1"/>
                 </a:solidFill>
@@ -6882,7 +5894,7 @@
               <a:t>https://</a:t>
             </a:r>
             <a:r>
-              <a:rPr lang="en-GB" sz="600" dirty="0" err="1">
+              <a:rPr lang="en-GB" sz="900" dirty="0" err="1">
                 <a:solidFill>
                   <a:schemeClr val="bg1"/>
                 </a:solidFill>
@@ -6892,7 +5904,7 @@
               <a:t>en.wikipedia.org</a:t>
             </a:r>
             <a:r>
-              <a:rPr lang="en-GB" sz="600" dirty="0">
+              <a:rPr lang="en-GB" sz="900" dirty="0">
                 <a:solidFill>
                   <a:schemeClr val="bg1"/>
                 </a:solidFill>
@@ -6902,7 +5914,7 @@
               <a:t>/wiki/</a:t>
             </a:r>
             <a:r>
-              <a:rPr lang="en-GB" sz="600" dirty="0" err="1">
+              <a:rPr lang="en-GB" sz="900" dirty="0" err="1">
                 <a:solidFill>
                   <a:schemeClr val="bg1"/>
                 </a:solidFill>
@@ -6912,7 +5924,7 @@
               <a:t>Refresh_rate</a:t>
             </a:r>
             <a:r>
-              <a:rPr lang="en-GB" sz="600" dirty="0">
+              <a:rPr lang="en-GB" sz="900" dirty="0">
                 <a:solidFill>
                   <a:schemeClr val="bg1"/>
                 </a:solidFill>
@@ -6922,7 +5934,7 @@
               <a:t>#/media/</a:t>
             </a:r>
             <a:r>
-              <a:rPr lang="en-GB" sz="600" dirty="0" err="1">
+              <a:rPr lang="en-GB" sz="900" dirty="0" err="1">
                 <a:solidFill>
                   <a:schemeClr val="bg1"/>
                 </a:solidFill>
@@ -6931,7 +5943,7 @@
               </a:rPr>
               <a:t>File:Waveform_video_comparison.gif</a:t>
             </a:r>
-            <a:endParaRPr lang="en-GB" sz="600" dirty="0">
+            <a:endParaRPr lang="en-GB" sz="900" dirty="0">
               <a:solidFill>
                 <a:schemeClr val="bg1"/>
               </a:solidFill>

</xml_diff>